<commit_message>
Updated Final Presentation, completed Specification and SOLID sections, added some design elements, starting up Clean Architecture section.
</commit_message>
<xml_diff>
--- a/Presentation/CSC207 Final Project Presentation Team24.pptx
+++ b/Presentation/CSC207 Final Project Presentation Team24.pptx
@@ -116,6 +116,11 @@
       </a:defRPr>
     </a:lvl9pPr>
   </p:defaultTextStyle>
+  <p:extLst>
+    <p:ext uri="{EFAFB233-063F-42B5-8137-9DF3F51BA10A}">
+      <p15:sldGuideLst xmlns:p15="http://schemas.microsoft.com/office/powerpoint/2012/main"/>
+    </p:ext>
+  </p:extLst>
 </p:presentation>
 </file>
 
@@ -349,7 +354,7 @@
             <a:fld id="{B61BEF0D-F0BB-DE4B-95CE-6DB70DBA9567}" type="datetimeFigureOut">
               <a:rPr lang="en-US" smtClean="0"/>
               <a:pPr/>
-              <a:t>11/30/23</a:t>
+              <a:t>12/1/23</a:t>
             </a:fld>
             <a:endParaRPr lang="en-US" dirty="0"/>
           </a:p>
@@ -685,7 +690,7 @@
             <a:fld id="{B61BEF0D-F0BB-DE4B-95CE-6DB70DBA9567}" type="datetimeFigureOut">
               <a:rPr lang="en-US" smtClean="0"/>
               <a:pPr/>
-              <a:t>11/30/23</a:t>
+              <a:t>12/1/23</a:t>
             </a:fld>
             <a:endParaRPr lang="en-US" dirty="0"/>
           </a:p>
@@ -965,7 +970,7 @@
             <a:fld id="{B61BEF0D-F0BB-DE4B-95CE-6DB70DBA9567}" type="datetimeFigureOut">
               <a:rPr lang="en-US" smtClean="0"/>
               <a:pPr/>
-              <a:t>11/30/23</a:t>
+              <a:t>12/1/23</a:t>
             </a:fld>
             <a:endParaRPr lang="en-US" dirty="0"/>
           </a:p>
@@ -1535,7 +1540,7 @@
             <a:fld id="{B61BEF0D-F0BB-DE4B-95CE-6DB70DBA9567}" type="datetimeFigureOut">
               <a:rPr lang="en-US" smtClean="0"/>
               <a:pPr/>
-              <a:t>11/30/23</a:t>
+              <a:t>12/1/23</a:t>
             </a:fld>
             <a:endParaRPr lang="en-US" dirty="0"/>
           </a:p>
@@ -1815,7 +1820,7 @@
             <a:fld id="{B61BEF0D-F0BB-DE4B-95CE-6DB70DBA9567}" type="datetimeFigureOut">
               <a:rPr lang="en-US" smtClean="0"/>
               <a:pPr/>
-              <a:t>11/30/23</a:t>
+              <a:t>12/1/23</a:t>
             </a:fld>
             <a:endParaRPr lang="en-US" dirty="0"/>
           </a:p>
@@ -2379,7 +2384,7 @@
             <a:fld id="{B61BEF0D-F0BB-DE4B-95CE-6DB70DBA9567}" type="datetimeFigureOut">
               <a:rPr lang="en-US" smtClean="0"/>
               <a:pPr/>
-              <a:t>11/30/23</a:t>
+              <a:t>12/1/23</a:t>
             </a:fld>
             <a:endParaRPr lang="en-US" dirty="0"/>
           </a:p>
@@ -2708,7 +2713,7 @@
             <a:fld id="{B61BEF0D-F0BB-DE4B-95CE-6DB70DBA9567}" type="datetimeFigureOut">
               <a:rPr lang="en-US" smtClean="0"/>
               <a:pPr/>
-              <a:t>11/30/23</a:t>
+              <a:t>12/1/23</a:t>
             </a:fld>
             <a:endParaRPr lang="en-US" dirty="0"/>
           </a:p>
@@ -2915,7 +2920,7 @@
             <a:fld id="{B61BEF0D-F0BB-DE4B-95CE-6DB70DBA9567}" type="datetimeFigureOut">
               <a:rPr lang="en-US" smtClean="0"/>
               <a:pPr/>
-              <a:t>11/30/23</a:t>
+              <a:t>12/1/23</a:t>
             </a:fld>
             <a:endParaRPr lang="en-US" dirty="0"/>
           </a:p>
@@ -3127,7 +3132,7 @@
             <a:fld id="{B61BEF0D-F0BB-DE4B-95CE-6DB70DBA9567}" type="datetimeFigureOut">
               <a:rPr lang="en-US" smtClean="0"/>
               <a:pPr/>
-              <a:t>11/30/23</a:t>
+              <a:t>12/1/23</a:t>
             </a:fld>
             <a:endParaRPr lang="en-US" dirty="0"/>
           </a:p>
@@ -3329,7 +3334,7 @@
             <a:fld id="{B61BEF0D-F0BB-DE4B-95CE-6DB70DBA9567}" type="datetimeFigureOut">
               <a:rPr lang="en-US" smtClean="0"/>
               <a:pPr/>
-              <a:t>11/30/23</a:t>
+              <a:t>12/1/23</a:t>
             </a:fld>
             <a:endParaRPr lang="en-US" dirty="0"/>
           </a:p>
@@ -3607,7 +3612,7 @@
             <a:fld id="{B61BEF0D-F0BB-DE4B-95CE-6DB70DBA9567}" type="datetimeFigureOut">
               <a:rPr lang="en-US" smtClean="0"/>
               <a:pPr/>
-              <a:t>11/30/23</a:t>
+              <a:t>12/1/23</a:t>
             </a:fld>
             <a:endParaRPr lang="en-US" dirty="0"/>
           </a:p>
@@ -3875,7 +3880,7 @@
             <a:fld id="{B61BEF0D-F0BB-DE4B-95CE-6DB70DBA9567}" type="datetimeFigureOut">
               <a:rPr lang="en-US" smtClean="0"/>
               <a:pPr/>
-              <a:t>11/30/23</a:t>
+              <a:t>12/1/23</a:t>
             </a:fld>
             <a:endParaRPr lang="en-US" dirty="0"/>
           </a:p>
@@ -4251,7 +4256,7 @@
             <a:fld id="{B61BEF0D-F0BB-DE4B-95CE-6DB70DBA9567}" type="datetimeFigureOut">
               <a:rPr lang="en-US" smtClean="0"/>
               <a:pPr/>
-              <a:t>11/30/23</a:t>
+              <a:t>12/1/23</a:t>
             </a:fld>
             <a:endParaRPr lang="en-US" dirty="0"/>
           </a:p>
@@ -4401,7 +4406,7 @@
             <a:fld id="{B61BEF0D-F0BB-DE4B-95CE-6DB70DBA9567}" type="datetimeFigureOut">
               <a:rPr lang="en-US" smtClean="0"/>
               <a:pPr/>
-              <a:t>11/30/23</a:t>
+              <a:t>12/1/23</a:t>
             </a:fld>
             <a:endParaRPr lang="en-US" dirty="0"/>
           </a:p>
@@ -4528,7 +4533,7 @@
             <a:fld id="{B61BEF0D-F0BB-DE4B-95CE-6DB70DBA9567}" type="datetimeFigureOut">
               <a:rPr lang="en-US" smtClean="0"/>
               <a:pPr/>
-              <a:t>11/30/23</a:t>
+              <a:t>12/1/23</a:t>
             </a:fld>
             <a:endParaRPr lang="en-US" dirty="0"/>
           </a:p>
@@ -4815,7 +4820,7 @@
             <a:fld id="{B61BEF0D-F0BB-DE4B-95CE-6DB70DBA9567}" type="datetimeFigureOut">
               <a:rPr lang="en-US" smtClean="0"/>
               <a:pPr/>
-              <a:t>11/30/23</a:t>
+              <a:t>12/1/23</a:t>
             </a:fld>
             <a:endParaRPr lang="en-US" dirty="0"/>
           </a:p>
@@ -5141,7 +5146,7 @@
             <a:fld id="{B61BEF0D-F0BB-DE4B-95CE-6DB70DBA9567}" type="datetimeFigureOut">
               <a:rPr lang="en-US" smtClean="0"/>
               <a:pPr/>
-              <a:t>11/30/23</a:t>
+              <a:t>12/1/23</a:t>
             </a:fld>
             <a:endParaRPr lang="en-US" dirty="0"/>
           </a:p>
@@ -5357,7 +5362,7 @@
             <a:fld id="{B61BEF0D-F0BB-DE4B-95CE-6DB70DBA9567}" type="datetimeFigureOut">
               <a:rPr lang="en-US" smtClean="0"/>
               <a:pPr/>
-              <a:t>11/30/23</a:t>
+              <a:t>12/1/23</a:t>
             </a:fld>
             <a:endParaRPr lang="en-US" dirty="0"/>
           </a:p>
@@ -5898,10 +5903,10 @@
           <a:lstStyle/>
           <a:p>
             <a:r>
-              <a:rPr kumimoji="1" lang="en-US" altLang="zh-CN" dirty="0"/>
+              <a:rPr kumimoji="1" lang="en-US" altLang="zh-CN" b="1" dirty="0"/>
               <a:t>CSC207 Final Project Presentation</a:t>
             </a:r>
-            <a:endParaRPr kumimoji="1" lang="zh-CN" altLang="en-US" dirty="0"/>
+            <a:endParaRPr kumimoji="1" lang="zh-CN" altLang="en-US" b="1" dirty="0"/>
           </a:p>
         </p:txBody>
       </p:sp>
@@ -6298,7 +6303,12 @@
             <p:ph type="title"/>
           </p:nvPr>
         </p:nvSpPr>
-        <p:spPr/>
+        <p:spPr>
+          <a:xfrm>
+            <a:off x="2755726" y="609600"/>
+            <a:ext cx="8061500" cy="1456267"/>
+          </a:xfrm>
+        </p:spPr>
         <p:txBody>
           <a:bodyPr/>
           <a:lstStyle/>
@@ -6311,26 +6321,74 @@
           </a:p>
         </p:txBody>
       </p:sp>
-      <p:sp>
-        <p:nvSpPr>
-          <p:cNvPr id="3" name="内容占位符 2">
+      <p:pic>
+        <p:nvPicPr>
+          <p:cNvPr id="5" name="内容占位符 4" descr="工作流 轮廓">
             <a:extLst>
               <a:ext uri="{FF2B5EF4-FFF2-40B4-BE49-F238E27FC236}">
-                <a16:creationId xmlns:a16="http://schemas.microsoft.com/office/drawing/2014/main" id="{1100D438-A7BA-A02A-AE8B-89049E21AEE1}"/>
+                <a16:creationId xmlns:a16="http://schemas.microsoft.com/office/drawing/2014/main" id="{4EBF07B3-B654-CB2B-9C31-A787E9C17639}"/>
               </a:ext>
             </a:extLst>
           </p:cNvPr>
-          <p:cNvSpPr>
-            <a:spLocks noGrp="1"/>
-          </p:cNvSpPr>
+          <p:cNvPicPr>
+            <a:picLocks noGrp="1" noChangeAspect="1"/>
+          </p:cNvPicPr>
           <p:nvPr>
             <p:ph idx="1"/>
           </p:nvPr>
-        </p:nvSpPr>
-        <p:spPr/>
-        <p:txBody>
-          <a:bodyPr/>
-          <a:lstStyle/>
+        </p:nvPicPr>
+        <p:blipFill>
+          <a:blip r:embed="rId2">
+            <a:extLst>
+              <a:ext uri="{96DAC541-7B7A-43D3-8B79-37D633B846F1}">
+                <asvg:svgBlip xmlns:asvg="http://schemas.microsoft.com/office/drawing/2016/SVG/main" r:embed="rId3"/>
+              </a:ext>
+            </a:extLst>
+          </a:blip>
+          <a:stretch>
+            <a:fillRect/>
+          </a:stretch>
+        </p:blipFill>
+        <p:spPr>
+          <a:xfrm>
+            <a:off x="1098092" y="741587"/>
+            <a:ext cx="1165848" cy="1165848"/>
+          </a:xfrm>
+        </p:spPr>
+      </p:pic>
+      <p:sp>
+        <p:nvSpPr>
+          <p:cNvPr id="6" name="文本框 5">
+            <a:extLst>
+              <a:ext uri="{FF2B5EF4-FFF2-40B4-BE49-F238E27FC236}">
+                <a16:creationId xmlns:a16="http://schemas.microsoft.com/office/drawing/2014/main" id="{37C328CA-AC54-392E-88BD-22044EB91059}"/>
+              </a:ext>
+            </a:extLst>
+          </p:cNvPr>
+          <p:cNvSpPr txBox="1"/>
+          <p:nvPr/>
+        </p:nvSpPr>
+        <p:spPr>
+          <a:xfrm>
+            <a:off x="1098092" y="2065867"/>
+            <a:ext cx="9498927" cy="1477328"/>
+          </a:xfrm>
+          <a:prstGeom prst="rect">
+            <a:avLst/>
+          </a:prstGeom>
+          <a:noFill/>
+        </p:spPr>
+        <p:txBody>
+          <a:bodyPr wrap="square" rtlCol="0">
+            <a:spAutoFit/>
+          </a:bodyPr>
+          <a:lstStyle/>
+          <a:p>
+            <a:r>
+              <a:rPr kumimoji="1" lang="en-US" altLang="zh-CN" dirty="0"/>
+              <a:t>Clean Architecture is the base of our Project. This is to say, all of our codes are built upon Clean Architecture – strictly following the rules and the Clean Architecture Engine, which ensured that our project codes are easy to maintain, extend, and test, largely due to its emphasis on separation of concerns and the Dependency Rule.</a:t>
+            </a:r>
+          </a:p>
           <a:p>
             <a:endParaRPr kumimoji="1" lang="zh-CN" altLang="en-US" dirty="0"/>
           </a:p>
@@ -6532,8 +6590,8 @@
         </p:nvSpPr>
         <p:spPr>
           <a:xfrm>
-            <a:off x="825909" y="808055"/>
-            <a:ext cx="3979205" cy="1453363"/>
+            <a:off x="1934592" y="808055"/>
+            <a:ext cx="2953857" cy="1453363"/>
           </a:xfrm>
         </p:spPr>
         <p:txBody>
@@ -6717,6 +6775,42 @@
           </a:p>
         </p:txBody>
       </p:sp>
+      <p:pic>
+        <p:nvPicPr>
+          <p:cNvPr id="7" name="图形 6" descr="插不插电 纯色填充">
+            <a:extLst>
+              <a:ext uri="{FF2B5EF4-FFF2-40B4-BE49-F238E27FC236}">
+                <a16:creationId xmlns:a16="http://schemas.microsoft.com/office/drawing/2014/main" id="{90448AE8-475F-4B43-0675-407A1E792814}"/>
+              </a:ext>
+            </a:extLst>
+          </p:cNvPr>
+          <p:cNvPicPr>
+            <a:picLocks noChangeAspect="1"/>
+          </p:cNvPicPr>
+          <p:nvPr/>
+        </p:nvPicPr>
+        <p:blipFill>
+          <a:blip r:embed="rId3">
+            <a:extLst>
+              <a:ext uri="{96DAC541-7B7A-43D3-8B79-37D633B846F1}">
+                <asvg:svgBlip xmlns:asvg="http://schemas.microsoft.com/office/drawing/2016/SVG/main" r:embed="rId4"/>
+              </a:ext>
+            </a:extLst>
+          </a:blip>
+          <a:stretch>
+            <a:fillRect/>
+          </a:stretch>
+        </p:blipFill>
+        <p:spPr>
+          <a:xfrm>
+            <a:off x="858971" y="1077536"/>
+            <a:ext cx="914400" cy="914400"/>
+          </a:xfrm>
+          <a:prstGeom prst="rect">
+            <a:avLst/>
+          </a:prstGeom>
+        </p:spPr>
+      </p:pic>
     </p:spTree>
     <p:extLst>
       <p:ext uri="{BB962C8B-B14F-4D97-AF65-F5344CB8AC3E}">
@@ -6817,6 +6911,15 @@
 <file path=ppt/slides/slide4.xml><?xml version="1.0" encoding="utf-8"?>
 <p:sld xmlns:a="http://schemas.openxmlformats.org/drawingml/2006/main" xmlns:r="http://schemas.openxmlformats.org/officeDocument/2006/relationships" xmlns:p="http://schemas.openxmlformats.org/presentationml/2006/main">
   <p:cSld>
+    <p:bg>
+      <p:bgPr>
+        <a:blipFill>
+          <a:blip r:embed="rId2"/>
+          <a:stretch/>
+        </a:blipFill>
+        <a:effectLst/>
+      </p:bgPr>
+    </p:bg>
     <p:spTree>
       <p:nvGrpSpPr>
         <p:cNvPr id="1" name=""/>
@@ -6847,11 +6950,19 @@
             <p:ph type="title"/>
           </p:nvPr>
         </p:nvSpPr>
-        <p:spPr/>
-        <p:txBody>
-          <a:bodyPr/>
-          <a:lstStyle/>
-          <a:p>
+        <p:spPr>
+          <a:xfrm>
+            <a:off x="4917879" y="334960"/>
+            <a:ext cx="6593075" cy="1612490"/>
+          </a:xfrm>
+        </p:spPr>
+        <p:txBody>
+          <a:bodyPr>
+            <a:normAutofit/>
+          </a:bodyPr>
+          <a:lstStyle/>
+          <a:p>
+            <a:pPr algn="ctr"/>
             <a:r>
               <a:rPr kumimoji="1" lang="en-US" altLang="zh-CN" dirty="0"/>
               <a:t>Specification</a:t>
@@ -6860,6 +6971,35 @@
           </a:p>
         </p:txBody>
       </p:sp>
+      <p:pic>
+        <p:nvPicPr>
+          <p:cNvPr id="5" name="Picture 4" descr="Commuters overlayed with colourful bokeh at night">
+            <a:extLst>
+              <a:ext uri="{FF2B5EF4-FFF2-40B4-BE49-F238E27FC236}">
+                <a16:creationId xmlns:a16="http://schemas.microsoft.com/office/drawing/2014/main" id="{ED6B6E0A-BEC4-AB36-22BC-AE53F92EDEA0}"/>
+              </a:ext>
+            </a:extLst>
+          </p:cNvPr>
+          <p:cNvPicPr>
+            <a:picLocks noChangeAspect="1"/>
+          </p:cNvPicPr>
+          <p:nvPr/>
+        </p:nvPicPr>
+        <p:blipFill rotWithShape="1">
+          <a:blip r:embed="rId3"/>
+          <a:srcRect l="23983" r="30893" b="-2"/>
+          <a:stretch/>
+        </p:blipFill>
+        <p:spPr>
+          <a:xfrm>
+            <a:off x="20" y="975"/>
+            <a:ext cx="4635988" cy="6858000"/>
+          </a:xfrm>
+          <a:prstGeom prst="rect">
+            <a:avLst/>
+          </a:prstGeom>
+        </p:spPr>
+      </p:pic>
       <p:sp>
         <p:nvSpPr>
           <p:cNvPr id="3" name="内容占位符 2">
@@ -6878,8 +7018,8 @@
         </p:nvSpPr>
         <p:spPr>
           <a:xfrm>
-            <a:off x="685801" y="1653436"/>
-            <a:ext cx="10131425" cy="4759889"/>
+            <a:off x="6308942" y="1734237"/>
+            <a:ext cx="5771983" cy="4484666"/>
           </a:xfrm>
         </p:spPr>
         <p:txBody>
@@ -6888,12 +7028,6 @@
           </a:bodyPr>
           <a:lstStyle/>
           <a:p>
-            <a:r>
-              <a:rPr kumimoji="1" lang="en-US" altLang="zh-CN" dirty="0"/>
-              <a:t>Functionality:</a:t>
-            </a:r>
-          </a:p>
-          <a:p>
             <a:pPr lvl="1"/>
             <a:r>
               <a:rPr kumimoji="1" lang="en-US" altLang="zh-CN" dirty="0"/>
@@ -6910,29 +7044,29 @@
           <a:p>
             <a:pPr lvl="2"/>
             <a:r>
-              <a:rPr kumimoji="1" lang="en-US" altLang="zh-CN" dirty="0"/>
+              <a:rPr kumimoji="1" lang="en-US" altLang="zh-CN" sz="1600" dirty="0"/>
               <a:t>Get Weather: Get weather conditions from the API</a:t>
             </a:r>
           </a:p>
           <a:p>
             <a:pPr lvl="2"/>
             <a:r>
-              <a:rPr kumimoji="1" lang="en-US" altLang="zh-CN" dirty="0"/>
+              <a:rPr kumimoji="1" lang="en-US" altLang="zh-CN" sz="1600" dirty="0"/>
               <a:t>Portal to Group: </a:t>
             </a:r>
             <a:r>
-              <a:rPr kumimoji="1" lang="en-US" altLang="zh-CN" dirty="0" err="1"/>
+              <a:rPr kumimoji="1" lang="en-US" altLang="zh-CN" sz="1600" dirty="0" err="1"/>
               <a:t>GroupView</a:t>
             </a:r>
             <a:r>
-              <a:rPr kumimoji="1" lang="en-US" altLang="zh-CN" dirty="0"/>
+              <a:rPr kumimoji="1" lang="en-US" altLang="zh-CN" sz="1600" dirty="0"/>
               <a:t>, access to group features</a:t>
             </a:r>
           </a:p>
           <a:p>
             <a:pPr lvl="2"/>
             <a:r>
-              <a:rPr kumimoji="1" lang="en-US" altLang="zh-CN" dirty="0"/>
+              <a:rPr kumimoji="1" lang="en-US" altLang="zh-CN" sz="1600" dirty="0"/>
               <a:t>(Not Ready) Portal to Trip</a:t>
             </a:r>
           </a:p>
@@ -6946,14 +7080,14 @@
           <a:p>
             <a:pPr lvl="2"/>
             <a:r>
-              <a:rPr kumimoji="1" lang="en-US" altLang="zh-CN" dirty="0"/>
+              <a:rPr kumimoji="1" lang="en-US" altLang="zh-CN" sz="1600" dirty="0"/>
               <a:t>Create Group</a:t>
             </a:r>
           </a:p>
           <a:p>
             <a:pPr lvl="2"/>
             <a:r>
-              <a:rPr kumimoji="1" lang="en-US" altLang="zh-CN" dirty="0"/>
+              <a:rPr kumimoji="1" lang="en-US" altLang="zh-CN" sz="1600" dirty="0"/>
               <a:t>Edit Group</a:t>
             </a:r>
           </a:p>
@@ -6967,14 +7101,14 @@
           <a:p>
             <a:pPr lvl="2"/>
             <a:r>
-              <a:rPr kumimoji="1" lang="en-US" altLang="zh-CN" dirty="0"/>
+              <a:rPr kumimoji="1" lang="en-US" altLang="zh-CN" sz="1600" dirty="0"/>
               <a:t>Create Trip</a:t>
             </a:r>
           </a:p>
           <a:p>
             <a:pPr lvl="2"/>
             <a:r>
-              <a:rPr kumimoji="1" lang="en-US" altLang="zh-CN" dirty="0"/>
+              <a:rPr kumimoji="1" lang="en-US" altLang="zh-CN" sz="1600" dirty="0"/>
               <a:t>Edit Trip</a:t>
             </a:r>
           </a:p>
@@ -6984,6 +7118,150 @@
           </a:p>
         </p:txBody>
       </p:sp>
+      <p:pic>
+        <p:nvPicPr>
+          <p:cNvPr id="6" name="图形 5" descr="旅行 轮廓">
+            <a:extLst>
+              <a:ext uri="{FF2B5EF4-FFF2-40B4-BE49-F238E27FC236}">
+                <a16:creationId xmlns:a16="http://schemas.microsoft.com/office/drawing/2014/main" id="{350A2BAE-3544-500C-9571-5D5743550B69}"/>
+              </a:ext>
+            </a:extLst>
+          </p:cNvPr>
+          <p:cNvPicPr>
+            <a:picLocks noChangeAspect="1"/>
+          </p:cNvPicPr>
+          <p:nvPr/>
+        </p:nvPicPr>
+        <p:blipFill>
+          <a:blip r:embed="rId4">
+            <a:extLst>
+              <a:ext uri="{96DAC541-7B7A-43D3-8B79-37D633B846F1}">
+                <asvg:svgBlip xmlns:asvg="http://schemas.microsoft.com/office/drawing/2016/SVG/main" r:embed="rId5"/>
+              </a:ext>
+            </a:extLst>
+          </a:blip>
+          <a:stretch>
+            <a:fillRect/>
+          </a:stretch>
+        </p:blipFill>
+        <p:spPr>
+          <a:xfrm>
+            <a:off x="5638800" y="4901001"/>
+            <a:ext cx="914400" cy="914400"/>
+          </a:xfrm>
+          <a:prstGeom prst="rect">
+            <a:avLst/>
+          </a:prstGeom>
+        </p:spPr>
+      </p:pic>
+      <p:pic>
+        <p:nvPicPr>
+          <p:cNvPr id="14" name="图形 13" descr="正在加载 轮廓">
+            <a:extLst>
+              <a:ext uri="{FF2B5EF4-FFF2-40B4-BE49-F238E27FC236}">
+                <a16:creationId xmlns:a16="http://schemas.microsoft.com/office/drawing/2014/main" id="{FEBAD2F8-3EB7-79A6-23F1-D633984649BE}"/>
+              </a:ext>
+            </a:extLst>
+          </p:cNvPr>
+          <p:cNvPicPr>
+            <a:picLocks noChangeAspect="1"/>
+          </p:cNvPicPr>
+          <p:nvPr/>
+        </p:nvPicPr>
+        <p:blipFill>
+          <a:blip r:embed="rId6">
+            <a:extLst>
+              <a:ext uri="{96DAC541-7B7A-43D3-8B79-37D633B846F1}">
+                <asvg:svgBlip xmlns:asvg="http://schemas.microsoft.com/office/drawing/2016/SVG/main" r:embed="rId7"/>
+              </a:ext>
+            </a:extLst>
+          </a:blip>
+          <a:stretch>
+            <a:fillRect/>
+          </a:stretch>
+        </p:blipFill>
+        <p:spPr>
+          <a:xfrm>
+            <a:off x="5567792" y="1646052"/>
+            <a:ext cx="914400" cy="914400"/>
+          </a:xfrm>
+          <a:prstGeom prst="rect">
+            <a:avLst/>
+          </a:prstGeom>
+        </p:spPr>
+      </p:pic>
+      <p:pic>
+        <p:nvPicPr>
+          <p:cNvPr id="16" name="图形 15" descr="入口 轮廓">
+            <a:extLst>
+              <a:ext uri="{FF2B5EF4-FFF2-40B4-BE49-F238E27FC236}">
+                <a16:creationId xmlns:a16="http://schemas.microsoft.com/office/drawing/2014/main" id="{B1F8B79F-0460-1E29-B5D8-B60BEF9C345D}"/>
+              </a:ext>
+            </a:extLst>
+          </p:cNvPr>
+          <p:cNvPicPr>
+            <a:picLocks noChangeAspect="1"/>
+          </p:cNvPicPr>
+          <p:nvPr/>
+        </p:nvPicPr>
+        <p:blipFill>
+          <a:blip r:embed="rId8">
+            <a:extLst>
+              <a:ext uri="{96DAC541-7B7A-43D3-8B79-37D633B846F1}">
+                <asvg:svgBlip xmlns:asvg="http://schemas.microsoft.com/office/drawing/2016/SVG/main" r:embed="rId9"/>
+              </a:ext>
+            </a:extLst>
+          </a:blip>
+          <a:stretch>
+            <a:fillRect/>
+          </a:stretch>
+        </p:blipFill>
+        <p:spPr>
+          <a:xfrm>
+            <a:off x="5659677" y="2716253"/>
+            <a:ext cx="780771" cy="780771"/>
+          </a:xfrm>
+          <a:prstGeom prst="rect">
+            <a:avLst/>
+          </a:prstGeom>
+        </p:spPr>
+      </p:pic>
+      <p:pic>
+        <p:nvPicPr>
+          <p:cNvPr id="18" name="图形 17" descr="用户 轮廓">
+            <a:extLst>
+              <a:ext uri="{FF2B5EF4-FFF2-40B4-BE49-F238E27FC236}">
+                <a16:creationId xmlns:a16="http://schemas.microsoft.com/office/drawing/2014/main" id="{02E3A3C4-11DF-AA65-6EFA-AC33DB0A4F85}"/>
+              </a:ext>
+            </a:extLst>
+          </p:cNvPr>
+          <p:cNvPicPr>
+            <a:picLocks noChangeAspect="1"/>
+          </p:cNvPicPr>
+          <p:nvPr/>
+        </p:nvPicPr>
+        <p:blipFill>
+          <a:blip r:embed="rId10">
+            <a:extLst>
+              <a:ext uri="{96DAC541-7B7A-43D3-8B79-37D633B846F1}">
+                <asvg:svgBlip xmlns:asvg="http://schemas.microsoft.com/office/drawing/2016/SVG/main" r:embed="rId11"/>
+              </a:ext>
+            </a:extLst>
+          </a:blip>
+          <a:stretch>
+            <a:fillRect/>
+          </a:stretch>
+        </p:blipFill>
+        <p:spPr>
+          <a:xfrm>
+            <a:off x="5592862" y="3808627"/>
+            <a:ext cx="914400" cy="914400"/>
+          </a:xfrm>
+          <a:prstGeom prst="rect">
+            <a:avLst/>
+          </a:prstGeom>
+        </p:spPr>
+      </p:pic>
     </p:spTree>
     <p:extLst>
       <p:ext uri="{BB962C8B-B14F-4D97-AF65-F5344CB8AC3E}">
@@ -7148,6 +7426,15 @@
 <file path=ppt/slides/slide7.xml><?xml version="1.0" encoding="utf-8"?>
 <p:sld xmlns:a="http://schemas.openxmlformats.org/drawingml/2006/main" xmlns:r="http://schemas.openxmlformats.org/officeDocument/2006/relationships" xmlns:p="http://schemas.openxmlformats.org/presentationml/2006/main">
   <p:cSld>
+    <p:bg>
+      <p:bgPr>
+        <a:blipFill>
+          <a:blip r:embed="rId2"/>
+          <a:stretch/>
+        </a:blipFill>
+        <a:effectLst/>
+      </p:bgPr>
+    </p:bg>
     <p:spTree>
       <p:nvGrpSpPr>
         <p:cNvPr id="1" name=""/>
@@ -7162,6 +7449,66 @@
           <a:chExt cx="0" cy="0"/>
         </a:xfrm>
       </p:grpSpPr>
+      <p:sp useBgFill="1">
+        <p:nvSpPr>
+          <p:cNvPr id="8" name="Rectangle 7">
+            <a:extLst>
+              <a:ext uri="{FF2B5EF4-FFF2-40B4-BE49-F238E27FC236}">
+                <a16:creationId xmlns:a16="http://schemas.microsoft.com/office/drawing/2014/main" id="{50E53EDA-3B94-4F6B-9E86-D3BB9EBB9616}"/>
+              </a:ext>
+              <a:ext uri="{C183D7F6-B498-43B3-948B-1728B52AA6E4}">
+                <adec:decorative xmlns:adec="http://schemas.microsoft.com/office/drawing/2017/decorative" val="1"/>
+              </a:ext>
+            </a:extLst>
+          </p:cNvPr>
+          <p:cNvSpPr>
+            <a:spLocks noGrp="1" noRot="1" noChangeAspect="1" noMove="1" noResize="1" noEditPoints="1" noAdjustHandles="1" noChangeArrowheads="1" noChangeShapeType="1" noTextEdit="1"/>
+          </p:cNvSpPr>
+          <p:nvPr>
+            <p:extLst>
+              <p:ext uri="{386F3935-93C4-4BCD-93E2-E3B085C9AB24}">
+                <p16:designElem xmlns:p16="http://schemas.microsoft.com/office/powerpoint/2015/main" val="1"/>
+              </p:ext>
+            </p:extLst>
+          </p:nvPr>
+        </p:nvSpPr>
+        <p:spPr>
+          <a:xfrm>
+            <a:off x="0" y="0"/>
+            <a:ext cx="12192000" cy="6858000"/>
+          </a:xfrm>
+          <a:prstGeom prst="rect">
+            <a:avLst/>
+          </a:prstGeom>
+          <a:ln>
+            <a:noFill/>
+          </a:ln>
+        </p:spPr>
+        <p:style>
+          <a:lnRef idx="2">
+            <a:schemeClr val="accent1">
+              <a:shade val="50000"/>
+            </a:schemeClr>
+          </a:lnRef>
+          <a:fillRef idx="1">
+            <a:schemeClr val="accent1"/>
+          </a:fillRef>
+          <a:effectRef idx="0">
+            <a:schemeClr val="accent1"/>
+          </a:effectRef>
+          <a:fontRef idx="minor">
+            <a:schemeClr val="lt1"/>
+          </a:fontRef>
+        </p:style>
+        <p:txBody>
+          <a:bodyPr rtlCol="0" anchor="ctr"/>
+          <a:lstStyle/>
+          <a:p>
+            <a:pPr algn="ctr"/>
+            <a:endParaRPr lang="en-US"/>
+          </a:p>
+        </p:txBody>
+      </p:sp>
       <p:sp>
         <p:nvSpPr>
           <p:cNvPr id="2" name="标题 1">
@@ -7178,11 +7525,19 @@
             <p:ph type="title"/>
           </p:nvPr>
         </p:nvSpPr>
-        <p:spPr/>
-        <p:txBody>
-          <a:bodyPr/>
-          <a:lstStyle/>
-          <a:p>
+        <p:spPr>
+          <a:xfrm>
+            <a:off x="673110" y="2615128"/>
+            <a:ext cx="3659389" cy="2948754"/>
+          </a:xfrm>
+        </p:spPr>
+        <p:txBody>
+          <a:bodyPr>
+            <a:normAutofit/>
+          </a:bodyPr>
+          <a:lstStyle/>
+          <a:p>
+            <a:pPr algn="r"/>
             <a:r>
               <a:rPr kumimoji="1" lang="en-US" altLang="zh-CN" dirty="0"/>
               <a:t>SOLID principles</a:t>
@@ -7191,6 +7546,54 @@
           </a:p>
         </p:txBody>
       </p:sp>
+      <p:cxnSp>
+        <p:nvCxnSpPr>
+          <p:cNvPr id="10" name="Straight Connector 9">
+            <a:extLst>
+              <a:ext uri="{FF2B5EF4-FFF2-40B4-BE49-F238E27FC236}">
+                <a16:creationId xmlns:a16="http://schemas.microsoft.com/office/drawing/2014/main" id="{30EFD79F-7790-479B-B7DB-BD0D8C101DDD}"/>
+              </a:ext>
+              <a:ext uri="{C183D7F6-B498-43B3-948B-1728B52AA6E4}">
+                <adec:decorative xmlns:adec="http://schemas.microsoft.com/office/drawing/2017/decorative" val="1"/>
+              </a:ext>
+            </a:extLst>
+          </p:cNvPr>
+          <p:cNvCxnSpPr>
+            <a:cxnSpLocks noGrp="1" noRot="1" noChangeAspect="1" noMove="1" noResize="1" noEditPoints="1" noAdjustHandles="1" noChangeArrowheads="1" noChangeShapeType="1"/>
+          </p:cNvCxnSpPr>
+          <p:nvPr>
+            <p:extLst>
+              <p:ext uri="{386F3935-93C4-4BCD-93E2-E3B085C9AB24}">
+                <p16:designElem xmlns:p16="http://schemas.microsoft.com/office/powerpoint/2015/main" val="1"/>
+              </p:ext>
+            </p:extLst>
+          </p:nvPr>
+        </p:nvCxnSpPr>
+        <p:spPr>
+          <a:xfrm>
+            <a:off x="4666923" y="1668780"/>
+            <a:ext cx="0" cy="3520440"/>
+          </a:xfrm>
+          <a:prstGeom prst="line">
+            <a:avLst/>
+          </a:prstGeom>
+          <a:ln w="19050"/>
+        </p:spPr>
+        <p:style>
+          <a:lnRef idx="1">
+            <a:schemeClr val="accent1"/>
+          </a:lnRef>
+          <a:fillRef idx="0">
+            <a:schemeClr val="accent1"/>
+          </a:fillRef>
+          <a:effectRef idx="0">
+            <a:schemeClr val="accent1"/>
+          </a:effectRef>
+          <a:fontRef idx="minor">
+            <a:schemeClr val="tx1"/>
+          </a:fontRef>
+        </p:style>
+      </p:cxnSp>
       <p:sp>
         <p:nvSpPr>
           <p:cNvPr id="3" name="内容占位符 2">
@@ -7207,46 +7610,53 @@
             <p:ph idx="1"/>
           </p:nvPr>
         </p:nvSpPr>
-        <p:spPr/>
-        <p:txBody>
-          <a:bodyPr/>
-          <a:lstStyle/>
-          <a:p>
-            <a:r>
-              <a:rPr lang="en-CA" altLang="zh-CN" dirty="0"/>
+        <p:spPr>
+          <a:xfrm>
+            <a:off x="5001348" y="1250284"/>
+            <a:ext cx="6723171" cy="4557849"/>
+          </a:xfrm>
+        </p:spPr>
+        <p:txBody>
+          <a:bodyPr>
+            <a:normAutofit/>
+          </a:bodyPr>
+          <a:lstStyle/>
+          <a:p>
+            <a:r>
+              <a:rPr lang="en-CA" altLang="zh-CN" sz="2000" dirty="0"/>
               <a:t>While we design our program and codes, we followed the principles what we have learnt in this course, by adherence to SOLID principles, our codes are promoted to be more understandable, flexible, and maintainable software design.</a:t>
             </a:r>
           </a:p>
           <a:p>
             <a:r>
-              <a:rPr lang="en-CA" altLang="zh-CN" dirty="0"/>
+              <a:rPr lang="en-CA" altLang="zh-CN" sz="2000" dirty="0"/>
               <a:t>Here are the three SOLID Principles we will evaluate further:</a:t>
             </a:r>
-            <a:endParaRPr lang="en-CA" altLang="zh-CN" i="0" u="none" strike="noStrike" dirty="0">
+            <a:endParaRPr lang="en-CA" altLang="zh-CN" sz="2000" i="0" u="none" strike="noStrike" dirty="0">
               <a:effectLst/>
             </a:endParaRPr>
           </a:p>
           <a:p>
             <a:pPr lvl="1"/>
             <a:r>
-              <a:rPr lang="en-CA" altLang="zh-CN" i="0" u="none" strike="noStrike" dirty="0">
+              <a:rPr lang="en-CA" altLang="zh-CN" sz="1800" i="0" u="none" strike="noStrike" dirty="0">
                 <a:effectLst/>
               </a:rPr>
               <a:t>Single Responsibility Principle (SRP)</a:t>
             </a:r>
-            <a:endParaRPr kumimoji="1" lang="en-CA" altLang="zh-CN" dirty="0"/>
+            <a:endParaRPr kumimoji="1" lang="en-CA" altLang="zh-CN" sz="1800" dirty="0"/>
           </a:p>
           <a:p>
             <a:pPr lvl="1"/>
             <a:r>
-              <a:rPr kumimoji="1" lang="en-CA" altLang="zh-CN" dirty="0"/>
+              <a:rPr kumimoji="1" lang="en-CA" altLang="zh-CN" sz="1800" dirty="0"/>
               <a:t>Interface Segregation Principle (ISP)</a:t>
             </a:r>
           </a:p>
           <a:p>
             <a:pPr lvl="1"/>
             <a:r>
-              <a:rPr kumimoji="1" lang="en-CA" altLang="zh-CN" dirty="0"/>
+              <a:rPr kumimoji="1" lang="en-CA" altLang="zh-CN" sz="1800" dirty="0"/>
               <a:t>Dependency Inversion Principle (DIP)</a:t>
             </a:r>
           </a:p>
@@ -7255,6 +7665,42 @@
           </a:p>
         </p:txBody>
       </p:sp>
+      <p:pic>
+        <p:nvPicPr>
+          <p:cNvPr id="7" name="图形 6" descr="清单演示文稿 纯色填充">
+            <a:extLst>
+              <a:ext uri="{FF2B5EF4-FFF2-40B4-BE49-F238E27FC236}">
+                <a16:creationId xmlns:a16="http://schemas.microsoft.com/office/drawing/2014/main" id="{5028BE0E-A276-E005-D859-47F622BA27BB}"/>
+              </a:ext>
+            </a:extLst>
+          </p:cNvPr>
+          <p:cNvPicPr>
+            <a:picLocks noChangeAspect="1"/>
+          </p:cNvPicPr>
+          <p:nvPr/>
+        </p:nvPicPr>
+        <p:blipFill>
+          <a:blip r:embed="rId3">
+            <a:extLst>
+              <a:ext uri="{96DAC541-7B7A-43D3-8B79-37D633B846F1}">
+                <asvg:svgBlip xmlns:asvg="http://schemas.microsoft.com/office/drawing/2016/SVG/main" r:embed="rId4"/>
+              </a:ext>
+            </a:extLst>
+          </a:blip>
+          <a:stretch>
+            <a:fillRect/>
+          </a:stretch>
+        </p:blipFill>
+        <p:spPr>
+          <a:xfrm>
+            <a:off x="1715392" y="1854173"/>
+            <a:ext cx="1574827" cy="1574827"/>
+          </a:xfrm>
+          <a:prstGeom prst="rect">
+            <a:avLst/>
+          </a:prstGeom>
+        </p:spPr>
+      </p:pic>
     </p:spTree>
     <p:extLst>
       <p:ext uri="{BB962C8B-B14F-4D97-AF65-F5344CB8AC3E}">
@@ -7301,16 +7747,28 @@
             <p:ph type="title"/>
           </p:nvPr>
         </p:nvSpPr>
-        <p:spPr/>
-        <p:txBody>
-          <a:bodyPr/>
-          <a:lstStyle/>
-          <a:p>
-            <a:r>
-              <a:rPr kumimoji="1" lang="en-CA" altLang="zh-CN" dirty="0"/>
+        <p:spPr>
+          <a:xfrm>
+            <a:off x="825909" y="808055"/>
+            <a:ext cx="3979205" cy="1453363"/>
+          </a:xfrm>
+        </p:spPr>
+        <p:txBody>
+          <a:bodyPr>
+            <a:normAutofit/>
+          </a:bodyPr>
+          <a:lstStyle/>
+          <a:p>
+            <a:pPr>
+              <a:lnSpc>
+                <a:spcPct val="90000"/>
+              </a:lnSpc>
+            </a:pPr>
+            <a:r>
+              <a:rPr kumimoji="1" lang="en-CA" altLang="zh-CN" sz="3300"/>
               <a:t>Single Responsibility Principle (SRP)</a:t>
             </a:r>
-            <a:endParaRPr kumimoji="1" lang="zh-CN" altLang="en-US" dirty="0"/>
+            <a:endParaRPr kumimoji="1" lang="zh-CN" altLang="en-US" sz="3300"/>
           </a:p>
         </p:txBody>
       </p:sp>
@@ -7330,9 +7788,16 @@
             <p:ph idx="1"/>
           </p:nvPr>
         </p:nvSpPr>
-        <p:spPr/>
-        <p:txBody>
-          <a:bodyPr/>
+        <p:spPr>
+          <a:xfrm>
+            <a:off x="802178" y="2261420"/>
+            <a:ext cx="4002936" cy="3637935"/>
+          </a:xfrm>
+        </p:spPr>
+        <p:txBody>
+          <a:bodyPr>
+            <a:normAutofit/>
+          </a:bodyPr>
           <a:lstStyle/>
           <a:p>
             <a:r>
@@ -7351,7 +7816,7 @@
             </a:r>
             <a:r>
               <a:rPr kumimoji="1" lang="en-US" altLang="zh-CN" dirty="0"/>
-              <a:t>class that only handles fetching weather data from the API.</a:t>
+              <a:t>class that only handles fetching weather data (GET) from the API, while View and other elements are from other classes.</a:t>
             </a:r>
           </a:p>
           <a:p>
@@ -7363,6 +7828,64 @@
           </a:p>
         </p:txBody>
       </p:sp>
+      <p:pic>
+        <p:nvPicPr>
+          <p:cNvPr id="4" name="图片 3" descr="文本&#10;&#10;描述已自动生成">
+            <a:extLst>
+              <a:ext uri="{FF2B5EF4-FFF2-40B4-BE49-F238E27FC236}">
+                <a16:creationId xmlns:a16="http://schemas.microsoft.com/office/drawing/2014/main" id="{4378477D-F543-5533-BBB4-8925B926BB38}"/>
+              </a:ext>
+            </a:extLst>
+          </p:cNvPr>
+          <p:cNvPicPr>
+            <a:picLocks noChangeAspect="1"/>
+          </p:cNvPicPr>
+          <p:nvPr/>
+        </p:nvPicPr>
+        <p:blipFill>
+          <a:blip r:embed="rId2"/>
+          <a:stretch>
+            <a:fillRect/>
+          </a:stretch>
+        </p:blipFill>
+        <p:spPr>
+          <a:xfrm>
+            <a:off x="5571725" y="796413"/>
+            <a:ext cx="5531647" cy="5102943"/>
+          </a:xfrm>
+          <a:prstGeom prst="roundRect">
+            <a:avLst>
+              <a:gd name="adj" fmla="val 4380"/>
+            </a:avLst>
+          </a:prstGeom>
+          <a:ln w="50800" cap="sq" cmpd="dbl">
+            <a:gradFill flip="none" rotWithShape="1">
+              <a:gsLst>
+                <a:gs pos="0">
+                  <a:srgbClr val="FFFFFF"/>
+                </a:gs>
+                <a:gs pos="100000">
+                  <a:schemeClr val="tx1">
+                    <a:alpha val="0"/>
+                  </a:schemeClr>
+                </a:gs>
+              </a:gsLst>
+              <a:path path="circle">
+                <a:fillToRect l="50000" t="50000" r="50000" b="50000"/>
+              </a:path>
+              <a:tileRect/>
+            </a:gradFill>
+            <a:miter lim="800000"/>
+          </a:ln>
+          <a:effectLst>
+            <a:outerShdw blurRad="254000" algn="tl" rotWithShape="0">
+              <a:srgbClr val="000000">
+                <a:alpha val="43000"/>
+              </a:srgbClr>
+            </a:outerShdw>
+          </a:effectLst>
+        </p:spPr>
+      </p:pic>
     </p:spTree>
     <p:extLst>
       <p:ext uri="{BB962C8B-B14F-4D97-AF65-F5344CB8AC3E}">
@@ -7379,6 +7902,15 @@
 <file path=ppt/slides/slide9.xml><?xml version="1.0" encoding="utf-8"?>
 <p:sld xmlns:a="http://schemas.openxmlformats.org/drawingml/2006/main" xmlns:r="http://schemas.openxmlformats.org/officeDocument/2006/relationships" xmlns:p="http://schemas.openxmlformats.org/presentationml/2006/main">
   <p:cSld>
+    <p:bg>
+      <p:bgPr>
+        <a:blipFill>
+          <a:blip r:embed="rId2"/>
+          <a:stretch/>
+        </a:blipFill>
+        <a:effectLst/>
+      </p:bgPr>
+    </p:bg>
     <p:spTree>
       <p:nvGrpSpPr>
         <p:cNvPr id="1" name=""/>
@@ -7409,9 +7941,16 @@
             <p:ph type="title"/>
           </p:nvPr>
         </p:nvSpPr>
-        <p:spPr/>
-        <p:txBody>
-          <a:bodyPr/>
+        <p:spPr>
+          <a:xfrm>
+            <a:off x="4882499" y="659704"/>
+            <a:ext cx="6282266" cy="1456267"/>
+          </a:xfrm>
+        </p:spPr>
+        <p:txBody>
+          <a:bodyPr>
+            <a:normAutofit/>
+          </a:bodyPr>
           <a:lstStyle/>
           <a:p>
             <a:r>
@@ -7440,12 +7979,14 @@
         </p:nvSpPr>
         <p:spPr>
           <a:xfrm>
-            <a:off x="6610613" y="1753760"/>
-            <a:ext cx="5163854" cy="4271259"/>
-          </a:xfrm>
-        </p:spPr>
-        <p:txBody>
-          <a:bodyPr/>
+            <a:off x="4882499" y="2218267"/>
+            <a:ext cx="6282266" cy="3649133"/>
+          </a:xfrm>
+        </p:spPr>
+        <p:txBody>
+          <a:bodyPr>
+            <a:normAutofit/>
+          </a:bodyPr>
           <a:lstStyle/>
           <a:p>
             <a:r>
@@ -7464,6 +8005,64 @@
           </a:p>
         </p:txBody>
       </p:sp>
+      <p:pic>
+        <p:nvPicPr>
+          <p:cNvPr id="5" name="图片 4" descr="图形用户界面&#10;&#10;低可信度描述已自动生成">
+            <a:extLst>
+              <a:ext uri="{FF2B5EF4-FFF2-40B4-BE49-F238E27FC236}">
+                <a16:creationId xmlns:a16="http://schemas.microsoft.com/office/drawing/2014/main" id="{4903E8AE-2348-4E3D-A14E-014DA8FD3E9C}"/>
+              </a:ext>
+            </a:extLst>
+          </p:cNvPr>
+          <p:cNvPicPr>
+            <a:picLocks noChangeAspect="1"/>
+          </p:cNvPicPr>
+          <p:nvPr/>
+        </p:nvPicPr>
+        <p:blipFill>
+          <a:blip r:embed="rId3"/>
+          <a:stretch>
+            <a:fillRect/>
+          </a:stretch>
+        </p:blipFill>
+        <p:spPr>
+          <a:xfrm>
+            <a:off x="1027235" y="1028700"/>
+            <a:ext cx="2580321" cy="4800599"/>
+          </a:xfrm>
+          <a:prstGeom prst="roundRect">
+            <a:avLst>
+              <a:gd name="adj" fmla="val 4380"/>
+            </a:avLst>
+          </a:prstGeom>
+          <a:ln w="50800" cap="sq" cmpd="dbl">
+            <a:gradFill flip="none" rotWithShape="1">
+              <a:gsLst>
+                <a:gs pos="0">
+                  <a:srgbClr val="FFFFFF"/>
+                </a:gs>
+                <a:gs pos="100000">
+                  <a:schemeClr val="tx1">
+                    <a:alpha val="0"/>
+                  </a:schemeClr>
+                </a:gs>
+              </a:gsLst>
+              <a:path path="circle">
+                <a:fillToRect l="50000" t="50000" r="50000" b="50000"/>
+              </a:path>
+              <a:tileRect/>
+            </a:gradFill>
+            <a:miter lim="800000"/>
+          </a:ln>
+          <a:effectLst>
+            <a:outerShdw blurRad="254000" algn="tl" rotWithShape="0">
+              <a:srgbClr val="000000">
+                <a:alpha val="43000"/>
+              </a:srgbClr>
+            </a:outerShdw>
+          </a:effectLst>
+        </p:spPr>
+      </p:pic>
     </p:spTree>
     <p:extLst>
       <p:ext uri="{BB962C8B-B14F-4D97-AF65-F5344CB8AC3E}">

</xml_diff>